<commit_message>
actualización de las presentaciones
</commit_message>
<xml_diff>
--- a/presentaciones/presentacion.pptx
+++ b/presentaciones/presentacion.pptx
@@ -5,7 +5,7 @@
     <p:sldMasterId id="2147483648" r:id="rId1"/>
   </p:sldMasterIdLst>
   <p:notesMasterIdLst>
-    <p:notesMasterId r:id="rId35"/>
+    <p:notesMasterId r:id="rId36"/>
   </p:notesMasterIdLst>
   <p:sldIdLst>
     <p:sldId id="256" r:id="rId2"/>
@@ -41,6 +41,7 @@
     <p:sldId id="291" r:id="rId32"/>
     <p:sldId id="279" r:id="rId33"/>
     <p:sldId id="285" r:id="rId34"/>
+    <p:sldId id="292" r:id="rId35"/>
   </p:sldIdLst>
   <p:sldSz cx="12192000" cy="6858000"/>
   <p:notesSz cx="6858000" cy="9144000"/>
@@ -5819,7 +5820,7 @@
               <c:strCache>
                 <c:ptCount val="1"/>
                 <c:pt idx="0">
-                  <c:v>Docker 155 clientes</c:v>
+                  <c:v>Docker 160 clientes</c:v>
                 </c:pt>
               </c:strCache>
             </c:strRef>
@@ -5916,13 +5917,13 @@
                 <c:formatCode>General</c:formatCode>
                 <c:ptCount val="3"/>
                 <c:pt idx="0">
-                  <c:v>94.7</c:v>
+                  <c:v>42.9</c:v>
                 </c:pt>
                 <c:pt idx="1">
-                  <c:v>99.9</c:v>
+                  <c:v>74.2</c:v>
                 </c:pt>
                 <c:pt idx="2">
-                  <c:v>0.1</c:v>
+                  <c:v>25.8</c:v>
                 </c:pt>
               </c:numCache>
             </c:numRef>
@@ -23711,7 +23712,7 @@
         </p:spPr>
         <p:txBody>
           <a:bodyPr vert="horz" lIns="91440" tIns="45720" rIns="91440" bIns="45720" rtlCol="0">
-            <a:normAutofit/>
+            <a:normAutofit lnSpcReduction="10000"/>
           </a:bodyPr>
           <a:lstStyle>
             <a:lvl1pPr marL="342900" indent="-342900" algn="l" defTabSz="457200" rtl="0" eaLnBrk="1" latinLnBrk="0" hangingPunct="1">
@@ -23943,7 +23944,7 @@
             </a:r>
             <a:r>
               <a:rPr lang="es-ES" dirty="0"/>
-              <a:t> al LXC, una al clon</a:t>
+              <a:t> al LXC, otra compartida con el clon</a:t>
             </a:r>
           </a:p>
           <a:p>
@@ -24666,7 +24667,7 @@
             <p:ph idx="1"/>
             <p:extLst>
               <p:ext uri="{D42A27DB-BD31-4B8C-83A1-F6EECF244321}">
-                <p14:modId xmlns:p14="http://schemas.microsoft.com/office/powerpoint/2010/main" val="3148944644"/>
+                <p14:modId xmlns:p14="http://schemas.microsoft.com/office/powerpoint/2010/main" val="3799384137"/>
               </p:ext>
             </p:extLst>
           </p:nvPr>
@@ -25533,6 +25534,101 @@
     <p:extLst>
       <p:ext uri="{BB962C8B-B14F-4D97-AF65-F5344CB8AC3E}">
         <p14:creationId xmlns:p14="http://schemas.microsoft.com/office/powerpoint/2010/main" val="3675858082"/>
+      </p:ext>
+    </p:extLst>
+  </p:cSld>
+  <p:clrMapOvr>
+    <a:masterClrMapping/>
+  </p:clrMapOvr>
+</p:sld>
+</file>
+
+<file path=ppt/slides/slide34.xml><?xml version="1.0" encoding="utf-8"?>
+<p:sld xmlns:a="http://schemas.openxmlformats.org/drawingml/2006/main" xmlns:r="http://schemas.openxmlformats.org/officeDocument/2006/relationships" xmlns:p="http://schemas.openxmlformats.org/presentationml/2006/main">
+  <p:cSld>
+    <p:spTree>
+      <p:nvGrpSpPr>
+        <p:cNvPr id="1" name=""/>
+        <p:cNvGrpSpPr/>
+        <p:nvPr/>
+      </p:nvGrpSpPr>
+      <p:grpSpPr>
+        <a:xfrm>
+          <a:off x="0" y="0"/>
+          <a:ext cx="0" cy="0"/>
+          <a:chOff x="0" y="0"/>
+          <a:chExt cx="0" cy="0"/>
+        </a:xfrm>
+      </p:grpSpPr>
+      <p:sp>
+        <p:nvSpPr>
+          <p:cNvPr id="3" name="Marcador de contenido 2"/>
+          <p:cNvSpPr>
+            <a:spLocks noGrp="1"/>
+          </p:cNvSpPr>
+          <p:nvPr>
+            <p:ph idx="1"/>
+          </p:nvPr>
+        </p:nvSpPr>
+        <p:spPr>
+          <a:xfrm>
+            <a:off x="3276600" y="2582779"/>
+            <a:ext cx="8915400" cy="3777622"/>
+          </a:xfrm>
+        </p:spPr>
+        <p:txBody>
+          <a:bodyPr>
+            <a:normAutofit/>
+          </a:bodyPr>
+          <a:lstStyle/>
+          <a:p>
+            <a:pPr marL="0" indent="0">
+              <a:buNone/>
+            </a:pPr>
+            <a:r>
+              <a:rPr lang="es-ES" sz="4400" dirty="0"/>
+              <a:t>Jesús Durán Hernández</a:t>
+            </a:r>
+          </a:p>
+          <a:p>
+            <a:pPr marL="0" indent="0">
+              <a:buNone/>
+            </a:pPr>
+            <a:r>
+              <a:rPr lang="es-ES" sz="4400" dirty="0"/>
+              <a:t>Rebeca Bárcena Orero</a:t>
+            </a:r>
+          </a:p>
+        </p:txBody>
+      </p:sp>
+      <p:sp>
+        <p:nvSpPr>
+          <p:cNvPr id="4" name="Marcador de número de diapositiva 3"/>
+          <p:cNvSpPr>
+            <a:spLocks noGrp="1"/>
+          </p:cNvSpPr>
+          <p:nvPr>
+            <p:ph type="sldNum" sz="quarter" idx="12"/>
+          </p:nvPr>
+        </p:nvSpPr>
+        <p:spPr/>
+        <p:txBody>
+          <a:bodyPr/>
+          <a:lstStyle/>
+          <a:p>
+            <a:fld id="{D57F1E4F-1CFF-5643-939E-217C01CDF565}" type="slidenum">
+              <a:rPr lang="en-US" smtClean="0"/>
+              <a:pPr/>
+              <a:t>34</a:t>
+            </a:fld>
+            <a:endParaRPr lang="en-US" dirty="0"/>
+          </a:p>
+        </p:txBody>
+      </p:sp>
+    </p:spTree>
+    <p:extLst>
+      <p:ext uri="{BB962C8B-B14F-4D97-AF65-F5344CB8AC3E}">
+        <p14:creationId xmlns:p14="http://schemas.microsoft.com/office/powerpoint/2010/main" val="1616314306"/>
       </p:ext>
     </p:extLst>
   </p:cSld>

</xml_diff>